<commit_message>
feat: add option to include energy loss detection in nonlinear reconstruction
</commit_message>
<xml_diff>
--- a/presentation/Stage：零磁场垂直入射非线性重建有能损波动.pptx
+++ b/presentation/Stage：零磁场垂直入射非线性重建有能损波动.pptx
@@ -126,6 +126,11 @@
       </a:defRPr>
     </a:lvl9pPr>
   </p:defaultTextStyle>
+  <p:extLst>
+    <p:ext uri="{EFAFB233-063F-42B5-8137-9DF3F51BA10A}">
+      <p15:sldGuideLst xmlns:p15="http://schemas.microsoft.com/office/powerpoint/2012/main"/>
+    </p:ext>
+  </p:extLst>
 </p:presentation>
 </file>
 
@@ -276,7 +281,7 @@
           <a:p>
             <a:fld id="{8EC97585-67EF-47AF-9E8A-8BA89D03EA53}" type="datetimeFigureOut">
               <a:rPr lang="zh-CN" altLang="en-US" smtClean="0"/>
-              <a:t>2025/1/22</a:t>
+              <a:t>2025/1/24</a:t>
             </a:fld>
             <a:endParaRPr lang="zh-CN" altLang="en-US"/>
           </a:p>
@@ -474,7 +479,7 @@
           <a:p>
             <a:fld id="{8EC97585-67EF-47AF-9E8A-8BA89D03EA53}" type="datetimeFigureOut">
               <a:rPr lang="zh-CN" altLang="en-US" smtClean="0"/>
-              <a:t>2025/1/22</a:t>
+              <a:t>2025/1/24</a:t>
             </a:fld>
             <a:endParaRPr lang="zh-CN" altLang="en-US"/>
           </a:p>
@@ -682,7 +687,7 @@
           <a:p>
             <a:fld id="{8EC97585-67EF-47AF-9E8A-8BA89D03EA53}" type="datetimeFigureOut">
               <a:rPr lang="zh-CN" altLang="en-US" smtClean="0"/>
-              <a:t>2025/1/22</a:t>
+              <a:t>2025/1/24</a:t>
             </a:fld>
             <a:endParaRPr lang="zh-CN" altLang="en-US"/>
           </a:p>
@@ -880,7 +885,7 @@
           <a:p>
             <a:fld id="{8EC97585-67EF-47AF-9E8A-8BA89D03EA53}" type="datetimeFigureOut">
               <a:rPr lang="zh-CN" altLang="en-US" smtClean="0"/>
-              <a:t>2025/1/22</a:t>
+              <a:t>2025/1/24</a:t>
             </a:fld>
             <a:endParaRPr lang="zh-CN" altLang="en-US"/>
           </a:p>
@@ -1155,7 +1160,7 @@
           <a:p>
             <a:fld id="{8EC97585-67EF-47AF-9E8A-8BA89D03EA53}" type="datetimeFigureOut">
               <a:rPr lang="zh-CN" altLang="en-US" smtClean="0"/>
-              <a:t>2025/1/22</a:t>
+              <a:t>2025/1/24</a:t>
             </a:fld>
             <a:endParaRPr lang="zh-CN" altLang="en-US"/>
           </a:p>
@@ -1420,7 +1425,7 @@
           <a:p>
             <a:fld id="{8EC97585-67EF-47AF-9E8A-8BA89D03EA53}" type="datetimeFigureOut">
               <a:rPr lang="zh-CN" altLang="en-US" smtClean="0"/>
-              <a:t>2025/1/22</a:t>
+              <a:t>2025/1/24</a:t>
             </a:fld>
             <a:endParaRPr lang="zh-CN" altLang="en-US"/>
           </a:p>
@@ -1832,7 +1837,7 @@
           <a:p>
             <a:fld id="{8EC97585-67EF-47AF-9E8A-8BA89D03EA53}" type="datetimeFigureOut">
               <a:rPr lang="zh-CN" altLang="en-US" smtClean="0"/>
-              <a:t>2025/1/22</a:t>
+              <a:t>2025/1/24</a:t>
             </a:fld>
             <a:endParaRPr lang="zh-CN" altLang="en-US"/>
           </a:p>
@@ -1973,7 +1978,7 @@
           <a:p>
             <a:fld id="{8EC97585-67EF-47AF-9E8A-8BA89D03EA53}" type="datetimeFigureOut">
               <a:rPr lang="zh-CN" altLang="en-US" smtClean="0"/>
-              <a:t>2025/1/22</a:t>
+              <a:t>2025/1/24</a:t>
             </a:fld>
             <a:endParaRPr lang="zh-CN" altLang="en-US"/>
           </a:p>
@@ -2086,7 +2091,7 @@
           <a:p>
             <a:fld id="{8EC97585-67EF-47AF-9E8A-8BA89D03EA53}" type="datetimeFigureOut">
               <a:rPr lang="zh-CN" altLang="en-US" smtClean="0"/>
-              <a:t>2025/1/22</a:t>
+              <a:t>2025/1/24</a:t>
             </a:fld>
             <a:endParaRPr lang="zh-CN" altLang="en-US"/>
           </a:p>
@@ -2397,7 +2402,7 @@
           <a:p>
             <a:fld id="{8EC97585-67EF-47AF-9E8A-8BA89D03EA53}" type="datetimeFigureOut">
               <a:rPr lang="zh-CN" altLang="en-US" smtClean="0"/>
-              <a:t>2025/1/22</a:t>
+              <a:t>2025/1/24</a:t>
             </a:fld>
             <a:endParaRPr lang="zh-CN" altLang="en-US"/>
           </a:p>
@@ -2685,7 +2690,7 @@
           <a:p>
             <a:fld id="{8EC97585-67EF-47AF-9E8A-8BA89D03EA53}" type="datetimeFigureOut">
               <a:rPr lang="zh-CN" altLang="en-US" smtClean="0"/>
-              <a:t>2025/1/22</a:t>
+              <a:t>2025/1/24</a:t>
             </a:fld>
             <a:endParaRPr lang="zh-CN" altLang="en-US"/>
           </a:p>
@@ -2926,7 +2931,7 @@
           <a:p>
             <a:fld id="{8EC97585-67EF-47AF-9E8A-8BA89D03EA53}" type="datetimeFigureOut">
               <a:rPr lang="zh-CN" altLang="en-US" smtClean="0"/>
-              <a:t>2025/1/22</a:t>
+              <a:t>2025/1/24</a:t>
             </a:fld>
             <a:endParaRPr lang="zh-CN" altLang="en-US"/>
           </a:p>
@@ -3469,13 +3474,13 @@
   <p:clrMapOvr>
     <a:masterClrMapping/>
   </p:clrMapOvr>
-  <mc:AlternateContent xmlns:mc="http://schemas.openxmlformats.org/markup-compatibility/2006">
-    <mc:Choice xmlns:p159="http://schemas.microsoft.com/office/powerpoint/2015/09/main" Requires="p159">
+  <mc:AlternateContent xmlns:mc="http://schemas.openxmlformats.org/markup-compatibility/2006" xmlns:p159="http://schemas.microsoft.com/office/powerpoint/2015/09/main">
+    <mc:Choice Requires="p159">
       <p:transition>
         <p159:morph option="byObject"/>
       </p:transition>
     </mc:Choice>
-    <mc:Fallback>
+    <mc:Fallback xmlns="">
       <p:transition>
         <p:fade/>
       </p:transition>
@@ -3566,8 +3571,8 @@
           </a:p>
         </p:txBody>
       </p:sp>
-      <mc:AlternateContent xmlns:mc="http://schemas.openxmlformats.org/markup-compatibility/2006">
-        <mc:Choice xmlns:a14="http://schemas.microsoft.com/office/drawing/2010/main" Requires="a14">
+      <mc:AlternateContent xmlns:mc="http://schemas.openxmlformats.org/markup-compatibility/2006" xmlns:a14="http://schemas.microsoft.com/office/drawing/2010/main">
+        <mc:Choice Requires="a14">
           <p:sp>
             <p:nvSpPr>
               <p:cNvPr id="3" name="文本框 2">
@@ -3701,7 +3706,7 @@
             </p:txBody>
           </p:sp>
         </mc:Choice>
-        <mc:Fallback>
+        <mc:Fallback xmlns="">
           <p:sp>
             <p:nvSpPr>
               <p:cNvPr id="3" name="文本框 2">
@@ -3780,8 +3785,8 @@
           </a:p>
         </p:txBody>
       </p:sp>
-      <mc:AlternateContent xmlns:mc="http://schemas.openxmlformats.org/markup-compatibility/2006">
-        <mc:Choice xmlns:a14="http://schemas.microsoft.com/office/drawing/2010/main" Requires="a14">
+      <mc:AlternateContent xmlns:mc="http://schemas.openxmlformats.org/markup-compatibility/2006" xmlns:a14="http://schemas.microsoft.com/office/drawing/2010/main">
+        <mc:Choice Requires="a14">
           <p:sp>
             <p:nvSpPr>
               <p:cNvPr id="8" name="文本框 7">
@@ -4097,7 +4102,7 @@
             </p:txBody>
           </p:sp>
         </mc:Choice>
-        <mc:Fallback>
+        <mc:Fallback xmlns="">
           <p:sp>
             <p:nvSpPr>
               <p:cNvPr id="8" name="文本框 7">
@@ -4159,7 +4164,7 @@
               <p:nvPr>
                 <p:extLst>
                   <p:ext uri="{D42A27DB-BD31-4B8C-83A1-F6EECF244321}">
-                    <p14:modId xmlns:p14="http://schemas.microsoft.com/office/powerpoint/2010/main" val="3068466724"/>
+                    <p14:modId xmlns:p14="http://schemas.microsoft.com/office/powerpoint/2010/main" val="3733241080"/>
                   </p:ext>
                 </p:extLst>
               </p:nvPr>
@@ -4692,17 +4697,6 @@
                                             </m:sSup>
                                           </m:num>
                                           <m:den>
-                                            <m:r>
-                                              <a:rPr lang="en-US" altLang="zh-CN" sz="2400" b="0" i="1" kern="1200" smtClean="0">
-                                                <a:solidFill>
-                                                  <a:schemeClr val="tx1"/>
-                                                </a:solidFill>
-                                                <a:latin typeface="Cambria Math" panose="02040503050406030204" pitchFamily="18" charset="0"/>
-                                                <a:ea typeface="华文楷体" panose="02010600040101010101" pitchFamily="2" charset="-122"/>
-                                                <a:cs typeface="+mn-cs"/>
-                                              </a:rPr>
-                                              <m:t>2</m:t>
-                                            </m:r>
                                             <m:sSubSup>
                                               <m:sSubSupPr>
                                                 <m:ctrlPr>
@@ -4902,7 +4896,7 @@
               <p:nvPr>
                 <p:extLst>
                   <p:ext uri="{D42A27DB-BD31-4B8C-83A1-F6EECF244321}">
-                    <p14:modId xmlns:p14="http://schemas.microsoft.com/office/powerpoint/2010/main" val="3068466724"/>
+                    <p14:modId xmlns:p14="http://schemas.microsoft.com/office/powerpoint/2010/main" val="3733241080"/>
                   </p:ext>
                 </p:extLst>
               </p:nvPr>
@@ -5067,8 +5061,8 @@
           </p:graphicFrame>
         </mc:Fallback>
       </mc:AlternateContent>
-      <mc:AlternateContent xmlns:mc="http://schemas.openxmlformats.org/markup-compatibility/2006">
-        <mc:Choice xmlns:a14="http://schemas.microsoft.com/office/drawing/2010/main" Requires="a14">
+      <mc:AlternateContent xmlns:mc="http://schemas.openxmlformats.org/markup-compatibility/2006" xmlns:a14="http://schemas.microsoft.com/office/drawing/2010/main">
+        <mc:Choice Requires="a14">
           <p:sp>
             <p:nvSpPr>
               <p:cNvPr id="6" name="文本框 5">
@@ -5142,7 +5136,7 @@
             </p:txBody>
           </p:sp>
         </mc:Choice>
-        <mc:Fallback>
+        <mc:Fallback xmlns="">
           <p:sp>
             <p:nvSpPr>
               <p:cNvPr id="6" name="文本框 5">
@@ -5204,7 +5198,7 @@
               <p:nvPr>
                 <p:extLst>
                   <p:ext uri="{D42A27DB-BD31-4B8C-83A1-F6EECF244321}">
-                    <p14:modId xmlns:p14="http://schemas.microsoft.com/office/powerpoint/2010/main" val="480246613"/>
+                    <p14:modId xmlns:p14="http://schemas.microsoft.com/office/powerpoint/2010/main" val="350849780"/>
                   </p:ext>
                 </p:extLst>
               </p:nvPr>
@@ -5544,17 +5538,6 @@
                                         </m:sSup>
                                       </m:num>
                                       <m:den>
-                                        <m:r>
-                                          <a:rPr lang="en-US" altLang="zh-CN" sz="2400" b="0" i="1" kern="1200" smtClean="0">
-                                            <a:solidFill>
-                                              <a:schemeClr val="tx1"/>
-                                            </a:solidFill>
-                                            <a:latin typeface="Cambria Math" panose="02040503050406030204" pitchFamily="18" charset="0"/>
-                                            <a:ea typeface="华文楷体" panose="02010600040101010101" pitchFamily="2" charset="-122"/>
-                                            <a:cs typeface="+mn-cs"/>
-                                          </a:rPr>
-                                          <m:t>2</m:t>
-                                        </m:r>
                                         <m:sSubSup>
                                           <m:sSubSupPr>
                                             <m:ctrlPr>
@@ -5752,7 +5735,7 @@
               <p:nvPr>
                 <p:extLst>
                   <p:ext uri="{D42A27DB-BD31-4B8C-83A1-F6EECF244321}">
-                    <p14:modId xmlns:p14="http://schemas.microsoft.com/office/powerpoint/2010/main" val="480246613"/>
+                    <p14:modId xmlns:p14="http://schemas.microsoft.com/office/powerpoint/2010/main" val="350849780"/>
                   </p:ext>
                 </p:extLst>
               </p:nvPr>
@@ -5917,8 +5900,8 @@
           </p:graphicFrame>
         </mc:Fallback>
       </mc:AlternateContent>
-      <mc:AlternateContent xmlns:mc="http://schemas.openxmlformats.org/markup-compatibility/2006">
-        <mc:Choice xmlns:a14="http://schemas.microsoft.com/office/drawing/2010/main" Requires="a14">
+      <mc:AlternateContent xmlns:mc="http://schemas.openxmlformats.org/markup-compatibility/2006" xmlns:a14="http://schemas.microsoft.com/office/drawing/2010/main">
+        <mc:Choice Requires="a14">
           <p:sp>
             <p:nvSpPr>
               <p:cNvPr id="12" name="文本框 11">
@@ -6015,7 +5998,7 @@
             </p:txBody>
           </p:sp>
         </mc:Choice>
-        <mc:Fallback>
+        <mc:Fallback xmlns="">
           <p:sp>
             <p:nvSpPr>
               <p:cNvPr id="12" name="文本框 11">
@@ -6070,13 +6053,13 @@
   <p:clrMapOvr>
     <a:masterClrMapping/>
   </p:clrMapOvr>
-  <mc:AlternateContent xmlns:mc="http://schemas.openxmlformats.org/markup-compatibility/2006">
-    <mc:Choice xmlns:p159="http://schemas.microsoft.com/office/powerpoint/2015/09/main" Requires="p159">
+  <mc:AlternateContent xmlns:mc="http://schemas.openxmlformats.org/markup-compatibility/2006" xmlns:p159="http://schemas.microsoft.com/office/powerpoint/2015/09/main">
+    <mc:Choice Requires="p159">
       <p:transition>
         <p159:morph option="byObject"/>
       </p:transition>
     </mc:Choice>
-    <mc:Fallback>
+    <mc:Fallback xmlns="">
       <p:transition>
         <p:fade/>
       </p:transition>
@@ -6167,8 +6150,8 @@
           </a:p>
         </p:txBody>
       </p:sp>
-      <mc:AlternateContent xmlns:mc="http://schemas.openxmlformats.org/markup-compatibility/2006">
-        <mc:Choice xmlns:a14="http://schemas.microsoft.com/office/drawing/2010/main" Requires="a14">
+      <mc:AlternateContent xmlns:mc="http://schemas.openxmlformats.org/markup-compatibility/2006" xmlns:a14="http://schemas.microsoft.com/office/drawing/2010/main">
+        <mc:Choice Requires="a14">
           <p:sp>
             <p:nvSpPr>
               <p:cNvPr id="3" name="文本框 2">
@@ -6285,7 +6268,7 @@
             </p:txBody>
           </p:sp>
         </mc:Choice>
-        <mc:Fallback>
+        <mc:Fallback xmlns="">
           <p:sp>
             <p:nvSpPr>
               <p:cNvPr id="3" name="文本框 2">
@@ -6364,8 +6347,8 @@
           </a:p>
         </p:txBody>
       </p:sp>
-      <mc:AlternateContent xmlns:mc="http://schemas.openxmlformats.org/markup-compatibility/2006">
-        <mc:Choice xmlns:a14="http://schemas.microsoft.com/office/drawing/2010/main" Requires="a14">
+      <mc:AlternateContent xmlns:mc="http://schemas.openxmlformats.org/markup-compatibility/2006" xmlns:a14="http://schemas.microsoft.com/office/drawing/2010/main">
+        <mc:Choice Requires="a14">
           <p:sp>
             <p:nvSpPr>
               <p:cNvPr id="8" name="文本框 7">
@@ -6507,7 +6490,7 @@
             </p:txBody>
           </p:sp>
         </mc:Choice>
-        <mc:Fallback>
+        <mc:Fallback xmlns="">
           <p:sp>
             <p:nvSpPr>
               <p:cNvPr id="8" name="文本框 7">
@@ -6636,8 +6619,8 @@
           </a:p>
         </p:txBody>
       </p:sp>
-      <mc:AlternateContent xmlns:mc="http://schemas.openxmlformats.org/markup-compatibility/2006">
-        <mc:Choice xmlns:a14="http://schemas.microsoft.com/office/drawing/2010/main" Requires="a14">
+      <mc:AlternateContent xmlns:mc="http://schemas.openxmlformats.org/markup-compatibility/2006" xmlns:a14="http://schemas.microsoft.com/office/drawing/2010/main">
+        <mc:Choice Requires="a14">
           <p:sp>
             <p:nvSpPr>
               <p:cNvPr id="4" name="文本框 3">
@@ -6775,7 +6758,7 @@
             </p:txBody>
           </p:sp>
         </mc:Choice>
-        <mc:Fallback>
+        <mc:Fallback xmlns="">
           <p:sp>
             <p:nvSpPr>
               <p:cNvPr id="4" name="文本框 3">
@@ -6820,8 +6803,8 @@
           </p:sp>
         </mc:Fallback>
       </mc:AlternateContent>
-      <mc:AlternateContent xmlns:mc="http://schemas.openxmlformats.org/markup-compatibility/2006">
-        <mc:Choice xmlns:a14="http://schemas.microsoft.com/office/drawing/2010/main" Requires="a14">
+      <mc:AlternateContent xmlns:mc="http://schemas.openxmlformats.org/markup-compatibility/2006" xmlns:a14="http://schemas.microsoft.com/office/drawing/2010/main">
+        <mc:Choice Requires="a14">
           <p:sp>
             <p:nvSpPr>
               <p:cNvPr id="5" name="文本框 4">
@@ -6954,7 +6937,7 @@
             </p:txBody>
           </p:sp>
         </mc:Choice>
-        <mc:Fallback>
+        <mc:Fallback xmlns="">
           <p:sp>
             <p:nvSpPr>
               <p:cNvPr id="5" name="文本框 4">
@@ -7009,13 +6992,13 @@
   <p:clrMapOvr>
     <a:masterClrMapping/>
   </p:clrMapOvr>
-  <mc:AlternateContent xmlns:mc="http://schemas.openxmlformats.org/markup-compatibility/2006">
-    <mc:Choice xmlns:p159="http://schemas.microsoft.com/office/powerpoint/2015/09/main" Requires="p159">
+  <mc:AlternateContent xmlns:mc="http://schemas.openxmlformats.org/markup-compatibility/2006" xmlns:p159="http://schemas.microsoft.com/office/powerpoint/2015/09/main">
+    <mc:Choice Requires="p159">
       <p:transition>
         <p159:morph option="byObject"/>
       </p:transition>
     </mc:Choice>
-    <mc:Fallback>
+    <mc:Fallback xmlns="">
       <p:transition>
         <p:fade/>
       </p:transition>
@@ -7238,8 +7221,8 @@
           </a:p>
         </p:txBody>
       </p:sp>
-      <mc:AlternateContent xmlns:mc="http://schemas.openxmlformats.org/markup-compatibility/2006">
-        <mc:Choice xmlns:a14="http://schemas.microsoft.com/office/drawing/2010/main" Requires="a14">
+      <mc:AlternateContent xmlns:mc="http://schemas.openxmlformats.org/markup-compatibility/2006" xmlns:a14="http://schemas.microsoft.com/office/drawing/2010/main">
+        <mc:Choice Requires="a14">
           <p:sp>
             <p:nvSpPr>
               <p:cNvPr id="12" name="文本框 11">
@@ -7333,7 +7316,7 @@
             </p:txBody>
           </p:sp>
         </mc:Choice>
-        <mc:Fallback>
+        <mc:Fallback xmlns="">
           <p:sp>
             <p:nvSpPr>
               <p:cNvPr id="12" name="文本框 11">
@@ -7472,13 +7455,13 @@
   <p:clrMapOvr>
     <a:masterClrMapping/>
   </p:clrMapOvr>
-  <mc:AlternateContent xmlns:mc="http://schemas.openxmlformats.org/markup-compatibility/2006">
-    <mc:Choice xmlns:p159="http://schemas.microsoft.com/office/powerpoint/2015/09/main" Requires="p159">
+  <mc:AlternateContent xmlns:mc="http://schemas.openxmlformats.org/markup-compatibility/2006" xmlns:p159="http://schemas.microsoft.com/office/powerpoint/2015/09/main">
+    <mc:Choice Requires="p159">
       <p:transition>
         <p159:morph option="byObject"/>
       </p:transition>
     </mc:Choice>
-    <mc:Fallback>
+    <mc:Fallback xmlns="">
       <p:transition>
         <p:fade/>
       </p:transition>
@@ -7601,8 +7584,8 @@
           </a:p>
         </p:txBody>
       </p:sp>
-      <mc:AlternateContent xmlns:mc="http://schemas.openxmlformats.org/markup-compatibility/2006">
-        <mc:Choice xmlns:a14="http://schemas.microsoft.com/office/drawing/2010/main" Requires="a14">
+      <mc:AlternateContent xmlns:mc="http://schemas.openxmlformats.org/markup-compatibility/2006" xmlns:a14="http://schemas.microsoft.com/office/drawing/2010/main">
+        <mc:Choice Requires="a14">
           <p:sp>
             <p:nvSpPr>
               <p:cNvPr id="3" name="文本框 2">
@@ -7731,7 +7714,7 @@
             </p:txBody>
           </p:sp>
         </mc:Choice>
-        <mc:Fallback>
+        <mc:Fallback xmlns="">
           <p:sp>
             <p:nvSpPr>
               <p:cNvPr id="3" name="文本框 2">
@@ -7944,13 +7927,13 @@
   <p:clrMapOvr>
     <a:masterClrMapping/>
   </p:clrMapOvr>
-  <mc:AlternateContent xmlns:mc="http://schemas.openxmlformats.org/markup-compatibility/2006">
-    <mc:Choice xmlns:p159="http://schemas.microsoft.com/office/powerpoint/2015/09/main" Requires="p159">
+  <mc:AlternateContent xmlns:mc="http://schemas.openxmlformats.org/markup-compatibility/2006" xmlns:p159="http://schemas.microsoft.com/office/powerpoint/2015/09/main">
+    <mc:Choice Requires="p159">
       <p:transition>
         <p159:morph option="byObject"/>
       </p:transition>
     </mc:Choice>
-    <mc:Fallback>
+    <mc:Fallback xmlns="">
       <p:transition>
         <p:fade/>
       </p:transition>
@@ -8321,8 +8304,8 @@
           </a:p>
         </p:txBody>
       </p:sp>
-      <mc:AlternateContent xmlns:mc="http://schemas.openxmlformats.org/markup-compatibility/2006">
-        <mc:Choice xmlns:a14="http://schemas.microsoft.com/office/drawing/2010/main" Requires="a14">
+      <mc:AlternateContent xmlns:mc="http://schemas.openxmlformats.org/markup-compatibility/2006" xmlns:a14="http://schemas.microsoft.com/office/drawing/2010/main">
+        <mc:Choice Requires="a14">
           <p:sp>
             <p:nvSpPr>
               <p:cNvPr id="11" name="文本框 10">
@@ -8459,7 +8442,7 @@
             </p:txBody>
           </p:sp>
         </mc:Choice>
-        <mc:Fallback>
+        <mc:Fallback xmlns="">
           <p:sp>
             <p:nvSpPr>
               <p:cNvPr id="11" name="文本框 10">
@@ -8514,13 +8497,13 @@
   <p:clrMapOvr>
     <a:masterClrMapping/>
   </p:clrMapOvr>
-  <mc:AlternateContent xmlns:mc="http://schemas.openxmlformats.org/markup-compatibility/2006">
-    <mc:Choice xmlns:p159="http://schemas.microsoft.com/office/powerpoint/2015/09/main" Requires="p159">
+  <mc:AlternateContent xmlns:mc="http://schemas.openxmlformats.org/markup-compatibility/2006" xmlns:p159="http://schemas.microsoft.com/office/powerpoint/2015/09/main">
+    <mc:Choice Requires="p159">
       <p:transition>
         <p159:morph option="byObject"/>
       </p:transition>
     </mc:Choice>
-    <mc:Fallback>
+    <mc:Fallback xmlns="">
       <p:transition>
         <p:fade/>
       </p:transition>
@@ -8727,8 +8710,8 @@
           </a:p>
         </p:txBody>
       </p:sp>
-      <mc:AlternateContent xmlns:mc="http://schemas.openxmlformats.org/markup-compatibility/2006">
-        <mc:Choice xmlns:a14="http://schemas.microsoft.com/office/drawing/2010/main" Requires="a14">
+      <mc:AlternateContent xmlns:mc="http://schemas.openxmlformats.org/markup-compatibility/2006" xmlns:a14="http://schemas.microsoft.com/office/drawing/2010/main">
+        <mc:Choice Requires="a14">
           <p:sp>
             <p:nvSpPr>
               <p:cNvPr id="12" name="文本框 11">
@@ -8864,7 +8847,7 @@
             </p:txBody>
           </p:sp>
         </mc:Choice>
-        <mc:Fallback>
+        <mc:Fallback xmlns="">
           <p:sp>
             <p:nvSpPr>
               <p:cNvPr id="12" name="文本框 11">
@@ -9144,13 +9127,13 @@
   <p:clrMapOvr>
     <a:masterClrMapping/>
   </p:clrMapOvr>
-  <mc:AlternateContent xmlns:mc="http://schemas.openxmlformats.org/markup-compatibility/2006">
-    <mc:Choice xmlns:p159="http://schemas.microsoft.com/office/powerpoint/2015/09/main" Requires="p159">
+  <mc:AlternateContent xmlns:mc="http://schemas.openxmlformats.org/markup-compatibility/2006" xmlns:p159="http://schemas.microsoft.com/office/powerpoint/2015/09/main">
+    <mc:Choice Requires="p159">
       <p:transition>
         <p159:morph option="byObject"/>
       </p:transition>
     </mc:Choice>
-    <mc:Fallback>
+    <mc:Fallback xmlns="">
       <p:transition>
         <p:fade/>
       </p:transition>
@@ -9357,8 +9340,8 @@
           </a:p>
         </p:txBody>
       </p:sp>
-      <mc:AlternateContent xmlns:mc="http://schemas.openxmlformats.org/markup-compatibility/2006">
-        <mc:Choice xmlns:a14="http://schemas.microsoft.com/office/drawing/2010/main" Requires="a14">
+      <mc:AlternateContent xmlns:mc="http://schemas.openxmlformats.org/markup-compatibility/2006" xmlns:a14="http://schemas.microsoft.com/office/drawing/2010/main">
+        <mc:Choice Requires="a14">
           <p:sp>
             <p:nvSpPr>
               <p:cNvPr id="12" name="文本框 11">
@@ -9494,7 +9477,7 @@
             </p:txBody>
           </p:sp>
         </mc:Choice>
-        <mc:Fallback>
+        <mc:Fallback xmlns="">
           <p:sp>
             <p:nvSpPr>
               <p:cNvPr id="12" name="文本框 11">
@@ -9539,8 +9522,8 @@
           </p:sp>
         </mc:Fallback>
       </mc:AlternateContent>
-      <mc:AlternateContent xmlns:mc="http://schemas.openxmlformats.org/markup-compatibility/2006">
-        <mc:Choice xmlns:a14="http://schemas.microsoft.com/office/drawing/2010/main" Requires="a14">
+      <mc:AlternateContent xmlns:mc="http://schemas.openxmlformats.org/markup-compatibility/2006" xmlns:a14="http://schemas.microsoft.com/office/drawing/2010/main">
+        <mc:Choice Requires="a14">
           <p:sp>
             <p:nvSpPr>
               <p:cNvPr id="16" name="文本框 15">
@@ -9646,7 +9629,7 @@
             </p:txBody>
           </p:sp>
         </mc:Choice>
-        <mc:Fallback>
+        <mc:Fallback xmlns="">
           <p:sp>
             <p:nvSpPr>
               <p:cNvPr id="16" name="文本框 15">
@@ -9701,13 +9684,13 @@
   <p:clrMapOvr>
     <a:masterClrMapping/>
   </p:clrMapOvr>
-  <mc:AlternateContent xmlns:mc="http://schemas.openxmlformats.org/markup-compatibility/2006">
-    <mc:Choice xmlns:p159="http://schemas.microsoft.com/office/powerpoint/2015/09/main" Requires="p159">
+  <mc:AlternateContent xmlns:mc="http://schemas.openxmlformats.org/markup-compatibility/2006" xmlns:p159="http://schemas.microsoft.com/office/powerpoint/2015/09/main">
+    <mc:Choice Requires="p159">
       <p:transition>
         <p159:morph option="byObject"/>
       </p:transition>
     </mc:Choice>
-    <mc:Fallback>
+    <mc:Fallback xmlns="">
       <p:transition>
         <p:fade/>
       </p:transition>
@@ -9820,8 +9803,8 @@
           </a:p>
         </p:txBody>
       </p:sp>
-      <mc:AlternateContent xmlns:mc="http://schemas.openxmlformats.org/markup-compatibility/2006">
-        <mc:Choice xmlns:a14="http://schemas.microsoft.com/office/drawing/2010/main" Requires="a14">
+      <mc:AlternateContent xmlns:mc="http://schemas.openxmlformats.org/markup-compatibility/2006" xmlns:a14="http://schemas.microsoft.com/office/drawing/2010/main">
+        <mc:Choice Requires="a14">
           <p:sp>
             <p:nvSpPr>
               <p:cNvPr id="3" name="文本框 2">
@@ -9913,15 +9896,7 @@
                         <a:ea typeface="华文楷体" panose="02010600040101010101" pitchFamily="2" charset="-122"/>
                         <a:cs typeface="+mj-cs"/>
                       </a:rPr>
-                      <m:t>=0.</m:t>
-                    </m:r>
-                    <m:r>
-                      <a:rPr lang="en-US" altLang="zh-CN" sz="2400" b="0" i="1" smtClean="0">
-                        <a:latin typeface="Cambria Math" panose="02040503050406030204" pitchFamily="18" charset="0"/>
-                        <a:ea typeface="华文楷体" panose="02010600040101010101" pitchFamily="2" charset="-122"/>
-                        <a:cs typeface="+mj-cs"/>
-                      </a:rPr>
-                      <m:t>4</m:t>
+                      <m:t>=0.4</m:t>
                     </m:r>
                   </m:oMath>
                 </a14:m>
@@ -9942,7 +9917,7 @@
             </p:txBody>
           </p:sp>
         </mc:Choice>
-        <mc:Fallback>
+        <mc:Fallback xmlns="">
           <p:sp>
             <p:nvSpPr>
               <p:cNvPr id="3" name="文本框 2">
@@ -10021,8 +9996,8 @@
           </a:p>
         </p:txBody>
       </p:sp>
-      <mc:AlternateContent xmlns:mc="http://schemas.openxmlformats.org/markup-compatibility/2006">
-        <mc:Choice xmlns:a14="http://schemas.microsoft.com/office/drawing/2010/main" Requires="a14">
+      <mc:AlternateContent xmlns:mc="http://schemas.openxmlformats.org/markup-compatibility/2006" xmlns:a14="http://schemas.microsoft.com/office/drawing/2010/main">
+        <mc:Choice Requires="a14">
           <p:sp>
             <p:nvSpPr>
               <p:cNvPr id="12" name="文本框 11">
@@ -10116,7 +10091,7 @@
             </p:txBody>
           </p:sp>
         </mc:Choice>
-        <mc:Fallback>
+        <mc:Fallback xmlns="">
           <p:sp>
             <p:nvSpPr>
               <p:cNvPr id="12" name="文本框 11">
@@ -10323,13 +10298,13 @@
   <p:clrMapOvr>
     <a:masterClrMapping/>
   </p:clrMapOvr>
-  <mc:AlternateContent xmlns:mc="http://schemas.openxmlformats.org/markup-compatibility/2006">
-    <mc:Choice xmlns:p159="http://schemas.microsoft.com/office/powerpoint/2015/09/main" Requires="p159">
+  <mc:AlternateContent xmlns:mc="http://schemas.openxmlformats.org/markup-compatibility/2006" xmlns:p159="http://schemas.microsoft.com/office/powerpoint/2015/09/main">
+    <mc:Choice Requires="p159">
       <p:transition>
         <p159:morph option="byObject"/>
       </p:transition>
     </mc:Choice>
-    <mc:Fallback>
+    <mc:Fallback xmlns="">
       <p:transition>
         <p:fade/>
       </p:transition>
@@ -10442,8 +10417,8 @@
           </a:p>
         </p:txBody>
       </p:sp>
-      <mc:AlternateContent xmlns:mc="http://schemas.openxmlformats.org/markup-compatibility/2006">
-        <mc:Choice xmlns:a14="http://schemas.microsoft.com/office/drawing/2010/main" Requires="a14">
+      <mc:AlternateContent xmlns:mc="http://schemas.openxmlformats.org/markup-compatibility/2006" xmlns:a14="http://schemas.microsoft.com/office/drawing/2010/main">
+        <mc:Choice Requires="a14">
           <p:sp>
             <p:nvSpPr>
               <p:cNvPr id="3" name="文本框 2">
@@ -10535,15 +10510,7 @@
                         <a:ea typeface="华文楷体" panose="02010600040101010101" pitchFamily="2" charset="-122"/>
                         <a:cs typeface="+mj-cs"/>
                       </a:rPr>
-                      <m:t>=0.4</m:t>
-                    </m:r>
-                    <m:r>
-                      <a:rPr lang="en-US" altLang="zh-CN" sz="2400" b="0" i="1" smtClean="0">
-                        <a:latin typeface="Cambria Math" panose="02040503050406030204" pitchFamily="18" charset="0"/>
-                        <a:ea typeface="华文楷体" panose="02010600040101010101" pitchFamily="2" charset="-122"/>
-                        <a:cs typeface="+mj-cs"/>
-                      </a:rPr>
-                      <m:t>6</m:t>
+                      <m:t>=0.46</m:t>
                     </m:r>
                   </m:oMath>
                 </a14:m>
@@ -10564,7 +10531,7 @@
             </p:txBody>
           </p:sp>
         </mc:Choice>
-        <mc:Fallback>
+        <mc:Fallback xmlns="">
           <p:sp>
             <p:nvSpPr>
               <p:cNvPr id="3" name="文本框 2">
@@ -10643,8 +10610,8 @@
           </a:p>
         </p:txBody>
       </p:sp>
-      <mc:AlternateContent xmlns:mc="http://schemas.openxmlformats.org/markup-compatibility/2006">
-        <mc:Choice xmlns:a14="http://schemas.microsoft.com/office/drawing/2010/main" Requires="a14">
+      <mc:AlternateContent xmlns:mc="http://schemas.openxmlformats.org/markup-compatibility/2006" xmlns:a14="http://schemas.microsoft.com/office/drawing/2010/main">
+        <mc:Choice Requires="a14">
           <p:sp>
             <p:nvSpPr>
               <p:cNvPr id="12" name="文本框 11">
@@ -10738,7 +10705,7 @@
             </p:txBody>
           </p:sp>
         </mc:Choice>
-        <mc:Fallback>
+        <mc:Fallback xmlns="">
           <p:sp>
             <p:nvSpPr>
               <p:cNvPr id="12" name="文本框 11">
@@ -10783,8 +10750,8 @@
           </p:sp>
         </mc:Fallback>
       </mc:AlternateContent>
-      <mc:AlternateContent xmlns:mc="http://schemas.openxmlformats.org/markup-compatibility/2006">
-        <mc:Choice xmlns:a14="http://schemas.microsoft.com/office/drawing/2010/main" Requires="a14">
+      <mc:AlternateContent xmlns:mc="http://schemas.openxmlformats.org/markup-compatibility/2006" xmlns:a14="http://schemas.microsoft.com/office/drawing/2010/main">
+        <mc:Choice Requires="a14">
           <p:sp>
             <p:nvSpPr>
               <p:cNvPr id="16" name="文本框 15">
@@ -10957,7 +10924,7 @@
             </p:txBody>
           </p:sp>
         </mc:Choice>
-        <mc:Fallback>
+        <mc:Fallback xmlns="">
           <p:sp>
             <p:nvSpPr>
               <p:cNvPr id="16" name="文本框 15">
@@ -11012,13 +10979,13 @@
   <p:clrMapOvr>
     <a:masterClrMapping/>
   </p:clrMapOvr>
-  <mc:AlternateContent xmlns:mc="http://schemas.openxmlformats.org/markup-compatibility/2006">
-    <mc:Choice xmlns:p159="http://schemas.microsoft.com/office/powerpoint/2015/09/main" Requires="p159">
+  <mc:AlternateContent xmlns:mc="http://schemas.openxmlformats.org/markup-compatibility/2006" xmlns:p159="http://schemas.microsoft.com/office/powerpoint/2015/09/main">
+    <mc:Choice Requires="p159">
       <p:transition>
         <p159:morph option="byObject"/>
       </p:transition>
     </mc:Choice>
-    <mc:Fallback>
+    <mc:Fallback xmlns="">
       <p:transition>
         <p:fade/>
       </p:transition>
@@ -11131,8 +11098,8 @@
           </a:p>
         </p:txBody>
       </p:sp>
-      <mc:AlternateContent xmlns:mc="http://schemas.openxmlformats.org/markup-compatibility/2006">
-        <mc:Choice xmlns:a14="http://schemas.microsoft.com/office/drawing/2010/main" Requires="a14">
+      <mc:AlternateContent xmlns:mc="http://schemas.openxmlformats.org/markup-compatibility/2006" xmlns:a14="http://schemas.microsoft.com/office/drawing/2010/main">
+        <mc:Choice Requires="a14">
           <p:sp>
             <p:nvSpPr>
               <p:cNvPr id="3" name="文本框 2">
@@ -11224,15 +11191,7 @@
                         <a:ea typeface="华文楷体" panose="02010600040101010101" pitchFamily="2" charset="-122"/>
                         <a:cs typeface="+mj-cs"/>
                       </a:rPr>
-                      <m:t>=0.</m:t>
-                    </m:r>
-                    <m:r>
-                      <a:rPr lang="en-US" altLang="zh-CN" sz="2400" b="0" i="1" smtClean="0">
-                        <a:latin typeface="Cambria Math" panose="02040503050406030204" pitchFamily="18" charset="0"/>
-                        <a:ea typeface="华文楷体" panose="02010600040101010101" pitchFamily="2" charset="-122"/>
-                        <a:cs typeface="+mj-cs"/>
-                      </a:rPr>
-                      <m:t>9</m:t>
+                      <m:t>=0.9</m:t>
                     </m:r>
                   </m:oMath>
                 </a14:m>
@@ -11253,7 +11212,7 @@
             </p:txBody>
           </p:sp>
         </mc:Choice>
-        <mc:Fallback>
+        <mc:Fallback xmlns="">
           <p:sp>
             <p:nvSpPr>
               <p:cNvPr id="3" name="文本框 2">
@@ -11332,8 +11291,8 @@
           </a:p>
         </p:txBody>
       </p:sp>
-      <mc:AlternateContent xmlns:mc="http://schemas.openxmlformats.org/markup-compatibility/2006">
-        <mc:Choice xmlns:a14="http://schemas.microsoft.com/office/drawing/2010/main" Requires="a14">
+      <mc:AlternateContent xmlns:mc="http://schemas.openxmlformats.org/markup-compatibility/2006" xmlns:a14="http://schemas.microsoft.com/office/drawing/2010/main">
+        <mc:Choice Requires="a14">
           <p:sp>
             <p:nvSpPr>
               <p:cNvPr id="12" name="文本框 11">
@@ -11427,7 +11386,7 @@
             </p:txBody>
           </p:sp>
         </mc:Choice>
-        <mc:Fallback>
+        <mc:Fallback xmlns="">
           <p:sp>
             <p:nvSpPr>
               <p:cNvPr id="12" name="文本框 11">
@@ -11472,8 +11431,8 @@
           </p:sp>
         </mc:Fallback>
       </mc:AlternateContent>
-      <mc:AlternateContent xmlns:mc="http://schemas.openxmlformats.org/markup-compatibility/2006">
-        <mc:Choice xmlns:a14="http://schemas.microsoft.com/office/drawing/2010/main" Requires="a14">
+      <mc:AlternateContent xmlns:mc="http://schemas.openxmlformats.org/markup-compatibility/2006" xmlns:a14="http://schemas.microsoft.com/office/drawing/2010/main">
+        <mc:Choice Requires="a14">
           <p:sp>
             <p:nvSpPr>
               <p:cNvPr id="16" name="文本框 15">
@@ -11555,7 +11514,7 @@
             </p:txBody>
           </p:sp>
         </mc:Choice>
-        <mc:Fallback>
+        <mc:Fallback xmlns="">
           <p:sp>
             <p:nvSpPr>
               <p:cNvPr id="16" name="文本框 15">
@@ -11610,13 +11569,13 @@
   <p:clrMapOvr>
     <a:masterClrMapping/>
   </p:clrMapOvr>
-  <mc:AlternateContent xmlns:mc="http://schemas.openxmlformats.org/markup-compatibility/2006">
-    <mc:Choice xmlns:p159="http://schemas.microsoft.com/office/powerpoint/2015/09/main" Requires="p159">
+  <mc:AlternateContent xmlns:mc="http://schemas.openxmlformats.org/markup-compatibility/2006" xmlns:p159="http://schemas.microsoft.com/office/powerpoint/2015/09/main">
+    <mc:Choice Requires="p159">
       <p:transition>
         <p159:morph option="byObject"/>
       </p:transition>
     </mc:Choice>
-    <mc:Fallback>
+    <mc:Fallback xmlns="">
       <p:transition>
         <p:fade/>
       </p:transition>
@@ -11798,13 +11757,13 @@
   <p:clrMapOvr>
     <a:masterClrMapping/>
   </p:clrMapOvr>
-  <mc:AlternateContent xmlns:mc="http://schemas.openxmlformats.org/markup-compatibility/2006">
-    <mc:Choice xmlns:p159="http://schemas.microsoft.com/office/powerpoint/2015/09/main" Requires="p159">
+  <mc:AlternateContent xmlns:mc="http://schemas.openxmlformats.org/markup-compatibility/2006" xmlns:p159="http://schemas.microsoft.com/office/powerpoint/2015/09/main">
+    <mc:Choice Requires="p159">
       <p:transition>
         <p159:morph option="byObject"/>
       </p:transition>
     </mc:Choice>
-    <mc:Fallback>
+    <mc:Fallback xmlns="">
       <p:transition>
         <p:fade/>
       </p:transition>
@@ -11917,8 +11876,8 @@
           </a:p>
         </p:txBody>
       </p:sp>
-      <mc:AlternateContent xmlns:mc="http://schemas.openxmlformats.org/markup-compatibility/2006">
-        <mc:Choice xmlns:a14="http://schemas.microsoft.com/office/drawing/2010/main" Requires="a14">
+      <mc:AlternateContent xmlns:mc="http://schemas.openxmlformats.org/markup-compatibility/2006" xmlns:a14="http://schemas.microsoft.com/office/drawing/2010/main">
+        <mc:Choice Requires="a14">
           <p:sp>
             <p:nvSpPr>
               <p:cNvPr id="3" name="文本框 2">
@@ -12031,7 +11990,7 @@
             </p:txBody>
           </p:sp>
         </mc:Choice>
-        <mc:Fallback>
+        <mc:Fallback xmlns="">
           <p:sp>
             <p:nvSpPr>
               <p:cNvPr id="3" name="文本框 2">
@@ -12110,8 +12069,8 @@
           </a:p>
         </p:txBody>
       </p:sp>
-      <mc:AlternateContent xmlns:mc="http://schemas.openxmlformats.org/markup-compatibility/2006">
-        <mc:Choice xmlns:a14="http://schemas.microsoft.com/office/drawing/2010/main" Requires="a14">
+      <mc:AlternateContent xmlns:mc="http://schemas.openxmlformats.org/markup-compatibility/2006" xmlns:a14="http://schemas.microsoft.com/office/drawing/2010/main">
+        <mc:Choice Requires="a14">
           <p:sp>
             <p:nvSpPr>
               <p:cNvPr id="12" name="文本框 11">
@@ -12205,7 +12164,7 @@
             </p:txBody>
           </p:sp>
         </mc:Choice>
-        <mc:Fallback>
+        <mc:Fallback xmlns="">
           <p:sp>
             <p:nvSpPr>
               <p:cNvPr id="12" name="文本框 11">
@@ -12328,13 +12287,13 @@
   <p:clrMapOvr>
     <a:masterClrMapping/>
   </p:clrMapOvr>
-  <mc:AlternateContent xmlns:mc="http://schemas.openxmlformats.org/markup-compatibility/2006">
-    <mc:Choice xmlns:p159="http://schemas.microsoft.com/office/powerpoint/2015/09/main" Requires="p159">
+  <mc:AlternateContent xmlns:mc="http://schemas.openxmlformats.org/markup-compatibility/2006" xmlns:p159="http://schemas.microsoft.com/office/powerpoint/2015/09/main">
+    <mc:Choice Requires="p159">
       <p:transition>
         <p159:morph option="byObject"/>
       </p:transition>
     </mc:Choice>
-    <mc:Fallback>
+    <mc:Fallback xmlns="">
       <p:transition>
         <p:fade/>
       </p:transition>
@@ -12447,8 +12406,8 @@
           </a:p>
         </p:txBody>
       </p:sp>
-      <mc:AlternateContent xmlns:mc="http://schemas.openxmlformats.org/markup-compatibility/2006">
-        <mc:Choice xmlns:a14="http://schemas.microsoft.com/office/drawing/2010/main" Requires="a14">
+      <mc:AlternateContent xmlns:mc="http://schemas.openxmlformats.org/markup-compatibility/2006" xmlns:a14="http://schemas.microsoft.com/office/drawing/2010/main">
+        <mc:Choice Requires="a14">
           <p:sp>
             <p:nvSpPr>
               <p:cNvPr id="3" name="文本框 2">
@@ -12561,7 +12520,7 @@
             </p:txBody>
           </p:sp>
         </mc:Choice>
-        <mc:Fallback>
+        <mc:Fallback xmlns="">
           <p:sp>
             <p:nvSpPr>
               <p:cNvPr id="3" name="文本框 2">
@@ -12640,8 +12599,8 @@
           </a:p>
         </p:txBody>
       </p:sp>
-      <mc:AlternateContent xmlns:mc="http://schemas.openxmlformats.org/markup-compatibility/2006">
-        <mc:Choice xmlns:a14="http://schemas.microsoft.com/office/drawing/2010/main" Requires="a14">
+      <mc:AlternateContent xmlns:mc="http://schemas.openxmlformats.org/markup-compatibility/2006" xmlns:a14="http://schemas.microsoft.com/office/drawing/2010/main">
+        <mc:Choice Requires="a14">
           <p:sp>
             <p:nvSpPr>
               <p:cNvPr id="12" name="文本框 11">
@@ -12735,7 +12694,7 @@
             </p:txBody>
           </p:sp>
         </mc:Choice>
-        <mc:Fallback>
+        <mc:Fallback xmlns="">
           <p:sp>
             <p:nvSpPr>
               <p:cNvPr id="12" name="文本框 11">
@@ -12858,13 +12817,13 @@
   <p:clrMapOvr>
     <a:masterClrMapping/>
   </p:clrMapOvr>
-  <mc:AlternateContent xmlns:mc="http://schemas.openxmlformats.org/markup-compatibility/2006">
-    <mc:Choice xmlns:p159="http://schemas.microsoft.com/office/powerpoint/2015/09/main" Requires="p159">
+  <mc:AlternateContent xmlns:mc="http://schemas.openxmlformats.org/markup-compatibility/2006" xmlns:p159="http://schemas.microsoft.com/office/powerpoint/2015/09/main">
+    <mc:Choice Requires="p159">
       <p:transition>
         <p159:morph option="byObject"/>
       </p:transition>
     </mc:Choice>
-    <mc:Fallback>
+    <mc:Fallback xmlns="">
       <p:transition>
         <p:fade/>
       </p:transition>
@@ -12977,8 +12936,8 @@
           </a:p>
         </p:txBody>
       </p:sp>
-      <mc:AlternateContent xmlns:mc="http://schemas.openxmlformats.org/markup-compatibility/2006">
-        <mc:Choice xmlns:a14="http://schemas.microsoft.com/office/drawing/2010/main" Requires="a14">
+      <mc:AlternateContent xmlns:mc="http://schemas.openxmlformats.org/markup-compatibility/2006" xmlns:a14="http://schemas.microsoft.com/office/drawing/2010/main">
+        <mc:Choice Requires="a14">
           <p:sp>
             <p:nvSpPr>
               <p:cNvPr id="3" name="文本框 2">
@@ -13091,7 +13050,7 @@
             </p:txBody>
           </p:sp>
         </mc:Choice>
-        <mc:Fallback>
+        <mc:Fallback xmlns="">
           <p:sp>
             <p:nvSpPr>
               <p:cNvPr id="3" name="文本框 2">
@@ -13170,8 +13129,8 @@
           </a:p>
         </p:txBody>
       </p:sp>
-      <mc:AlternateContent xmlns:mc="http://schemas.openxmlformats.org/markup-compatibility/2006">
-        <mc:Choice xmlns:a14="http://schemas.microsoft.com/office/drawing/2010/main" Requires="a14">
+      <mc:AlternateContent xmlns:mc="http://schemas.openxmlformats.org/markup-compatibility/2006" xmlns:a14="http://schemas.microsoft.com/office/drawing/2010/main">
+        <mc:Choice Requires="a14">
           <p:sp>
             <p:nvSpPr>
               <p:cNvPr id="12" name="文本框 11">
@@ -13265,7 +13224,7 @@
             </p:txBody>
           </p:sp>
         </mc:Choice>
-        <mc:Fallback>
+        <mc:Fallback xmlns="">
           <p:sp>
             <p:nvSpPr>
               <p:cNvPr id="12" name="文本框 11">
@@ -13310,8 +13269,8 @@
           </p:sp>
         </mc:Fallback>
       </mc:AlternateContent>
-      <mc:AlternateContent xmlns:mc="http://schemas.openxmlformats.org/markup-compatibility/2006">
-        <mc:Choice xmlns:a14="http://schemas.microsoft.com/office/drawing/2010/main" Requires="a14">
+      <mc:AlternateContent xmlns:mc="http://schemas.openxmlformats.org/markup-compatibility/2006" xmlns:a14="http://schemas.microsoft.com/office/drawing/2010/main">
+        <mc:Choice Requires="a14">
           <p:sp>
             <p:nvSpPr>
               <p:cNvPr id="16" name="文本框 15">
@@ -13446,7 +13405,7 @@
             </p:txBody>
           </p:sp>
         </mc:Choice>
-        <mc:Fallback>
+        <mc:Fallback xmlns="">
           <p:sp>
             <p:nvSpPr>
               <p:cNvPr id="16" name="文本框 15">
@@ -13501,13 +13460,13 @@
   <p:clrMapOvr>
     <a:masterClrMapping/>
   </p:clrMapOvr>
-  <mc:AlternateContent xmlns:mc="http://schemas.openxmlformats.org/markup-compatibility/2006">
-    <mc:Choice xmlns:p159="http://schemas.microsoft.com/office/powerpoint/2015/09/main" Requires="p159">
+  <mc:AlternateContent xmlns:mc="http://schemas.openxmlformats.org/markup-compatibility/2006" xmlns:p159="http://schemas.microsoft.com/office/powerpoint/2015/09/main">
+    <mc:Choice Requires="p159">
       <p:transition>
         <p159:morph option="byObject"/>
       </p:transition>
     </mc:Choice>
-    <mc:Fallback>
+    <mc:Fallback xmlns="">
       <p:transition>
         <p:fade/>
       </p:transition>
@@ -13974,13 +13933,13 @@
   <p:clrMapOvr>
     <a:masterClrMapping/>
   </p:clrMapOvr>
-  <mc:AlternateContent xmlns:mc="http://schemas.openxmlformats.org/markup-compatibility/2006">
-    <mc:Choice xmlns:p159="http://schemas.microsoft.com/office/powerpoint/2015/09/main" Requires="p159">
+  <mc:AlternateContent xmlns:mc="http://schemas.openxmlformats.org/markup-compatibility/2006" xmlns:p159="http://schemas.microsoft.com/office/powerpoint/2015/09/main">
+    <mc:Choice Requires="p159">
       <p:transition>
         <p159:morph option="byObject"/>
       </p:transition>
     </mc:Choice>
-    <mc:Fallback>
+    <mc:Fallback xmlns="">
       <p:transition>
         <p:fade/>
       </p:transition>
@@ -14353,13 +14312,13 @@
   <p:clrMapOvr>
     <a:masterClrMapping/>
   </p:clrMapOvr>
-  <mc:AlternateContent xmlns:mc="http://schemas.openxmlformats.org/markup-compatibility/2006">
-    <mc:Choice xmlns:p159="http://schemas.microsoft.com/office/powerpoint/2015/09/main" Requires="p159">
+  <mc:AlternateContent xmlns:mc="http://schemas.openxmlformats.org/markup-compatibility/2006" xmlns:p159="http://schemas.microsoft.com/office/powerpoint/2015/09/main">
+    <mc:Choice Requires="p159">
       <p:transition>
         <p159:morph option="byObject"/>
       </p:transition>
     </mc:Choice>
-    <mc:Fallback>
+    <mc:Fallback xmlns="">
       <p:transition>
         <p:fade/>
       </p:transition>
@@ -14510,8 +14469,8 @@
           </a:p>
         </p:txBody>
       </p:sp>
-      <mc:AlternateContent xmlns:mc="http://schemas.openxmlformats.org/markup-compatibility/2006">
-        <mc:Choice xmlns:a14="http://schemas.microsoft.com/office/drawing/2010/main" Requires="a14">
+      <mc:AlternateContent xmlns:mc="http://schemas.openxmlformats.org/markup-compatibility/2006" xmlns:a14="http://schemas.microsoft.com/office/drawing/2010/main">
+        <mc:Choice Requires="a14">
           <p:graphicFrame>
             <p:nvGraphicFramePr>
               <p:cNvPr id="5" name="表格 4">
@@ -15249,7 +15208,7 @@
             </a:graphic>
           </p:graphicFrame>
         </mc:Choice>
-        <mc:Fallback>
+        <mc:Fallback xmlns="">
           <p:graphicFrame>
             <p:nvGraphicFramePr>
               <p:cNvPr id="5" name="表格 4">
@@ -15430,8 +15389,8 @@
           </p:graphicFrame>
         </mc:Fallback>
       </mc:AlternateContent>
-      <mc:AlternateContent xmlns:mc="http://schemas.openxmlformats.org/markup-compatibility/2006">
-        <mc:Choice xmlns:a14="http://schemas.microsoft.com/office/drawing/2010/main" Requires="a14">
+      <mc:AlternateContent xmlns:mc="http://schemas.openxmlformats.org/markup-compatibility/2006" xmlns:a14="http://schemas.microsoft.com/office/drawing/2010/main">
+        <mc:Choice Requires="a14">
           <p:graphicFrame>
             <p:nvGraphicFramePr>
               <p:cNvPr id="6" name="表格 5">
@@ -15891,7 +15850,7 @@
             </a:graphic>
           </p:graphicFrame>
         </mc:Choice>
-        <mc:Fallback>
+        <mc:Fallback xmlns="">
           <p:graphicFrame>
             <p:nvGraphicFramePr>
               <p:cNvPr id="6" name="表格 5">
@@ -16106,8 +16065,8 @@
           </a:p>
         </p:txBody>
       </p:sp>
-      <mc:AlternateContent xmlns:mc="http://schemas.openxmlformats.org/markup-compatibility/2006">
-        <mc:Choice xmlns:a14="http://schemas.microsoft.com/office/drawing/2010/main" Requires="a14">
+      <mc:AlternateContent xmlns:mc="http://schemas.openxmlformats.org/markup-compatibility/2006" xmlns:a14="http://schemas.microsoft.com/office/drawing/2010/main">
+        <mc:Choice Requires="a14">
           <p:sp>
             <p:nvSpPr>
               <p:cNvPr id="11" name="文本框 10">
@@ -16208,7 +16167,7 @@
             </p:txBody>
           </p:sp>
         </mc:Choice>
-        <mc:Fallback>
+        <mc:Fallback xmlns="">
           <p:sp>
             <p:nvSpPr>
               <p:cNvPr id="11" name="文本框 10">
@@ -16253,8 +16212,8 @@
           </p:sp>
         </mc:Fallback>
       </mc:AlternateContent>
-      <mc:AlternateContent xmlns:mc="http://schemas.openxmlformats.org/markup-compatibility/2006">
-        <mc:Choice xmlns:a14="http://schemas.microsoft.com/office/drawing/2010/main" Requires="a14">
+      <mc:AlternateContent xmlns:mc="http://schemas.openxmlformats.org/markup-compatibility/2006" xmlns:a14="http://schemas.microsoft.com/office/drawing/2010/main">
+        <mc:Choice Requires="a14">
           <p:sp>
             <p:nvSpPr>
               <p:cNvPr id="13" name="文本框 12">
@@ -16405,7 +16364,7 @@
             </p:txBody>
           </p:sp>
         </mc:Choice>
-        <mc:Fallback>
+        <mc:Fallback xmlns="">
           <p:sp>
             <p:nvSpPr>
               <p:cNvPr id="13" name="文本框 12">
@@ -16450,8 +16409,8 @@
           </p:sp>
         </mc:Fallback>
       </mc:AlternateContent>
-      <mc:AlternateContent xmlns:mc="http://schemas.openxmlformats.org/markup-compatibility/2006">
-        <mc:Choice xmlns:a14="http://schemas.microsoft.com/office/drawing/2010/main" Requires="a14">
+      <mc:AlternateContent xmlns:mc="http://schemas.openxmlformats.org/markup-compatibility/2006" xmlns:a14="http://schemas.microsoft.com/office/drawing/2010/main">
+        <mc:Choice Requires="a14">
           <p:sp>
             <p:nvSpPr>
               <p:cNvPr id="14" name="文本框 13">
@@ -16538,7 +16497,7 @@
             </p:txBody>
           </p:sp>
         </mc:Choice>
-        <mc:Fallback>
+        <mc:Fallback xmlns="">
           <p:sp>
             <p:nvSpPr>
               <p:cNvPr id="14" name="文本框 13">
@@ -16653,8 +16612,8 @@
           </a:p>
         </p:txBody>
       </p:sp>
-      <mc:AlternateContent xmlns:mc="http://schemas.openxmlformats.org/markup-compatibility/2006">
-        <mc:Choice xmlns:a14="http://schemas.microsoft.com/office/drawing/2010/main" Requires="a14">
+      <mc:AlternateContent xmlns:mc="http://schemas.openxmlformats.org/markup-compatibility/2006" xmlns:a14="http://schemas.microsoft.com/office/drawing/2010/main">
+        <mc:Choice Requires="a14">
           <p:graphicFrame>
             <p:nvGraphicFramePr>
               <p:cNvPr id="4" name="表格 3">
@@ -17248,7 +17207,7 @@
             </a:graphic>
           </p:graphicFrame>
         </mc:Choice>
-        <mc:Fallback>
+        <mc:Fallback xmlns="">
           <p:graphicFrame>
             <p:nvGraphicFramePr>
               <p:cNvPr id="4" name="表格 3">
@@ -17439,13 +17398,13 @@
   <p:clrMapOvr>
     <a:masterClrMapping/>
   </p:clrMapOvr>
-  <mc:AlternateContent xmlns:mc="http://schemas.openxmlformats.org/markup-compatibility/2006">
-    <mc:Choice xmlns:p159="http://schemas.microsoft.com/office/powerpoint/2015/09/main" Requires="p159">
+  <mc:AlternateContent xmlns:mc="http://schemas.openxmlformats.org/markup-compatibility/2006" xmlns:p159="http://schemas.microsoft.com/office/powerpoint/2015/09/main">
+    <mc:Choice Requires="p159">
       <p:transition>
         <p159:morph option="byObject"/>
       </p:transition>
     </mc:Choice>
-    <mc:Fallback>
+    <mc:Fallback xmlns="">
       <p:transition>
         <p:fade/>
       </p:transition>
@@ -17612,8 +17571,8 @@
           </a:p>
         </p:txBody>
       </p:sp>
-      <mc:AlternateContent xmlns:mc="http://schemas.openxmlformats.org/markup-compatibility/2006">
-        <mc:Choice xmlns:a14="http://schemas.microsoft.com/office/drawing/2010/main" Requires="a14">
+      <mc:AlternateContent xmlns:mc="http://schemas.openxmlformats.org/markup-compatibility/2006" xmlns:a14="http://schemas.microsoft.com/office/drawing/2010/main">
+        <mc:Choice Requires="a14">
           <p:graphicFrame>
             <p:nvGraphicFramePr>
               <p:cNvPr id="5" name="表格 4">
@@ -17988,7 +17947,7 @@
             </a:graphic>
           </p:graphicFrame>
         </mc:Choice>
-        <mc:Fallback>
+        <mc:Fallback xmlns="">
           <p:graphicFrame>
             <p:nvGraphicFramePr>
               <p:cNvPr id="5" name="表格 4">
@@ -18163,8 +18122,8 @@
           </p:graphicFrame>
         </mc:Fallback>
       </mc:AlternateContent>
-      <mc:AlternateContent xmlns:mc="http://schemas.openxmlformats.org/markup-compatibility/2006">
-        <mc:Choice xmlns:a14="http://schemas.microsoft.com/office/drawing/2010/main" Requires="a14">
+      <mc:AlternateContent xmlns:mc="http://schemas.openxmlformats.org/markup-compatibility/2006" xmlns:a14="http://schemas.microsoft.com/office/drawing/2010/main">
+        <mc:Choice Requires="a14">
           <p:graphicFrame>
             <p:nvGraphicFramePr>
               <p:cNvPr id="6" name="表格 5">
@@ -18451,7 +18410,7 @@
             </a:graphic>
           </p:graphicFrame>
         </mc:Choice>
-        <mc:Fallback>
+        <mc:Fallback xmlns="">
           <p:graphicFrame>
             <p:nvGraphicFramePr>
               <p:cNvPr id="6" name="表格 5">
@@ -18660,8 +18619,8 @@
           </a:p>
         </p:txBody>
       </p:sp>
-      <mc:AlternateContent xmlns:mc="http://schemas.openxmlformats.org/markup-compatibility/2006">
-        <mc:Choice xmlns:a14="http://schemas.microsoft.com/office/drawing/2010/main" Requires="a14">
+      <mc:AlternateContent xmlns:mc="http://schemas.openxmlformats.org/markup-compatibility/2006" xmlns:a14="http://schemas.microsoft.com/office/drawing/2010/main">
+        <mc:Choice Requires="a14">
           <p:sp>
             <p:nvSpPr>
               <p:cNvPr id="11" name="文本框 10">
@@ -18742,7 +18701,7 @@
             </p:txBody>
           </p:sp>
         </mc:Choice>
-        <mc:Fallback>
+        <mc:Fallback xmlns="">
           <p:sp>
             <p:nvSpPr>
               <p:cNvPr id="11" name="文本框 10">
@@ -18787,8 +18746,8 @@
           </p:sp>
         </mc:Fallback>
       </mc:AlternateContent>
-      <mc:AlternateContent xmlns:mc="http://schemas.openxmlformats.org/markup-compatibility/2006">
-        <mc:Choice xmlns:a14="http://schemas.microsoft.com/office/drawing/2010/main" Requires="a14">
+      <mc:AlternateContent xmlns:mc="http://schemas.openxmlformats.org/markup-compatibility/2006" xmlns:a14="http://schemas.microsoft.com/office/drawing/2010/main">
+        <mc:Choice Requires="a14">
           <p:sp>
             <p:nvSpPr>
               <p:cNvPr id="13" name="文本框 12">
@@ -18951,7 +18910,7 @@
             </p:txBody>
           </p:sp>
         </mc:Choice>
-        <mc:Fallback>
+        <mc:Fallback xmlns="">
           <p:sp>
             <p:nvSpPr>
               <p:cNvPr id="13" name="文本框 12">
@@ -18996,8 +18955,8 @@
           </p:sp>
         </mc:Fallback>
       </mc:AlternateContent>
-      <mc:AlternateContent xmlns:mc="http://schemas.openxmlformats.org/markup-compatibility/2006">
-        <mc:Choice xmlns:a14="http://schemas.microsoft.com/office/drawing/2010/main" Requires="a14">
+      <mc:AlternateContent xmlns:mc="http://schemas.openxmlformats.org/markup-compatibility/2006" xmlns:a14="http://schemas.microsoft.com/office/drawing/2010/main">
+        <mc:Choice Requires="a14">
           <p:sp>
             <p:nvSpPr>
               <p:cNvPr id="14" name="文本框 13">
@@ -19201,7 +19160,7 @@
             </p:txBody>
           </p:sp>
         </mc:Choice>
-        <mc:Fallback>
+        <mc:Fallback xmlns="">
           <p:sp>
             <p:nvSpPr>
               <p:cNvPr id="14" name="文本框 13">
@@ -19355,13 +19314,13 @@
   <p:clrMapOvr>
     <a:masterClrMapping/>
   </p:clrMapOvr>
-  <mc:AlternateContent xmlns:mc="http://schemas.openxmlformats.org/markup-compatibility/2006">
-    <mc:Choice xmlns:p159="http://schemas.microsoft.com/office/powerpoint/2015/09/main" Requires="p159">
+  <mc:AlternateContent xmlns:mc="http://schemas.openxmlformats.org/markup-compatibility/2006" xmlns:p159="http://schemas.microsoft.com/office/powerpoint/2015/09/main">
+    <mc:Choice Requires="p159">
       <p:transition>
         <p159:morph option="byObject"/>
       </p:transition>
     </mc:Choice>
-    <mc:Fallback>
+    <mc:Fallback xmlns="">
       <p:transition>
         <p:fade/>
       </p:transition>
@@ -19452,8 +19411,8 @@
           </a:p>
         </p:txBody>
       </p:sp>
-      <mc:AlternateContent xmlns:mc="http://schemas.openxmlformats.org/markup-compatibility/2006">
-        <mc:Choice xmlns:a14="http://schemas.microsoft.com/office/drawing/2010/main" Requires="a14">
+      <mc:AlternateContent xmlns:mc="http://schemas.openxmlformats.org/markup-compatibility/2006" xmlns:a14="http://schemas.microsoft.com/office/drawing/2010/main">
+        <mc:Choice Requires="a14">
           <p:sp>
             <p:nvSpPr>
               <p:cNvPr id="3" name="文本框 2">
@@ -19593,7 +19552,7 @@
             </p:txBody>
           </p:sp>
         </mc:Choice>
-        <mc:Fallback>
+        <mc:Fallback xmlns="">
           <p:sp>
             <p:nvSpPr>
               <p:cNvPr id="3" name="文本框 2">
@@ -19672,8 +19631,8 @@
           </a:p>
         </p:txBody>
       </p:sp>
-      <mc:AlternateContent xmlns:mc="http://schemas.openxmlformats.org/markup-compatibility/2006">
-        <mc:Choice xmlns:a14="http://schemas.microsoft.com/office/drawing/2010/main" Requires="a14">
+      <mc:AlternateContent xmlns:mc="http://schemas.openxmlformats.org/markup-compatibility/2006" xmlns:a14="http://schemas.microsoft.com/office/drawing/2010/main">
+        <mc:Choice Requires="a14">
           <p:graphicFrame>
             <p:nvGraphicFramePr>
               <p:cNvPr id="4" name="表格 3">
@@ -20073,7 +20032,7 @@
             </a:graphic>
           </p:graphicFrame>
         </mc:Choice>
-        <mc:Fallback>
+        <mc:Fallback xmlns="">
           <p:graphicFrame>
             <p:nvGraphicFramePr>
               <p:cNvPr id="4" name="表格 3">
@@ -20391,13 +20350,13 @@
   <p:clrMapOvr>
     <a:masterClrMapping/>
   </p:clrMapOvr>
-  <mc:AlternateContent xmlns:mc="http://schemas.openxmlformats.org/markup-compatibility/2006">
-    <mc:Choice xmlns:p159="http://schemas.microsoft.com/office/powerpoint/2015/09/main" Requires="p159">
+  <mc:AlternateContent xmlns:mc="http://schemas.openxmlformats.org/markup-compatibility/2006" xmlns:p159="http://schemas.microsoft.com/office/powerpoint/2015/09/main">
+    <mc:Choice Requires="p159">
       <p:transition>
         <p159:morph option="byObject"/>
       </p:transition>
     </mc:Choice>
-    <mc:Fallback>
+    <mc:Fallback xmlns="">
       <p:transition>
         <p:fade/>
       </p:transition>
@@ -20590,8 +20549,8 @@
           </a:p>
         </p:txBody>
       </p:sp>
-      <mc:AlternateContent xmlns:mc="http://schemas.openxmlformats.org/markup-compatibility/2006">
-        <mc:Choice xmlns:a14="http://schemas.microsoft.com/office/drawing/2010/main" Requires="a14">
+      <mc:AlternateContent xmlns:mc="http://schemas.openxmlformats.org/markup-compatibility/2006" xmlns:a14="http://schemas.microsoft.com/office/drawing/2010/main">
+        <mc:Choice Requires="a14">
           <p:graphicFrame>
             <p:nvGraphicFramePr>
               <p:cNvPr id="4" name="表格 3">
@@ -21274,7 +21233,7 @@
             </a:graphic>
           </p:graphicFrame>
         </mc:Choice>
-        <mc:Fallback>
+        <mc:Fallback xmlns="">
           <p:graphicFrame>
             <p:nvGraphicFramePr>
               <p:cNvPr id="4" name="表格 3">
@@ -21502,8 +21461,8 @@
           </a:p>
         </p:txBody>
       </p:sp>
-      <mc:AlternateContent xmlns:mc="http://schemas.openxmlformats.org/markup-compatibility/2006">
-        <mc:Choice xmlns:a14="http://schemas.microsoft.com/office/drawing/2010/main" Requires="a14">
+      <mc:AlternateContent xmlns:mc="http://schemas.openxmlformats.org/markup-compatibility/2006" xmlns:a14="http://schemas.microsoft.com/office/drawing/2010/main">
+        <mc:Choice Requires="a14">
           <p:sp>
             <p:nvSpPr>
               <p:cNvPr id="5" name="文本框 4">
@@ -21670,7 +21629,7 @@
             </p:txBody>
           </p:sp>
         </mc:Choice>
-        <mc:Fallback>
+        <mc:Fallback xmlns="">
           <p:sp>
             <p:nvSpPr>
               <p:cNvPr id="5" name="文本框 4">
@@ -21715,8 +21674,8 @@
           </p:sp>
         </mc:Fallback>
       </mc:AlternateContent>
-      <mc:AlternateContent xmlns:mc="http://schemas.openxmlformats.org/markup-compatibility/2006">
-        <mc:Choice xmlns:a14="http://schemas.microsoft.com/office/drawing/2010/main" Requires="a14">
+      <mc:AlternateContent xmlns:mc="http://schemas.openxmlformats.org/markup-compatibility/2006" xmlns:a14="http://schemas.microsoft.com/office/drawing/2010/main">
+        <mc:Choice Requires="a14">
           <p:sp>
             <p:nvSpPr>
               <p:cNvPr id="6" name="文本框 5">
@@ -21813,7 +21772,7 @@
             </p:txBody>
           </p:sp>
         </mc:Choice>
-        <mc:Fallback>
+        <mc:Fallback xmlns="">
           <p:sp>
             <p:nvSpPr>
               <p:cNvPr id="6" name="文本框 5">
@@ -21928,13 +21887,13 @@
   <p:clrMapOvr>
     <a:masterClrMapping/>
   </p:clrMapOvr>
-  <mc:AlternateContent xmlns:mc="http://schemas.openxmlformats.org/markup-compatibility/2006">
-    <mc:Choice xmlns:p159="http://schemas.microsoft.com/office/powerpoint/2015/09/main" Requires="p159">
+  <mc:AlternateContent xmlns:mc="http://schemas.openxmlformats.org/markup-compatibility/2006" xmlns:p159="http://schemas.microsoft.com/office/powerpoint/2015/09/main">
+    <mc:Choice Requires="p159">
       <p:transition>
         <p159:morph option="byObject"/>
       </p:transition>
     </mc:Choice>
-    <mc:Fallback>
+    <mc:Fallback xmlns="">
       <p:transition>
         <p:fade/>
       </p:transition>
@@ -22111,8 +22070,8 @@
           </a:p>
         </p:txBody>
       </p:sp>
-      <mc:AlternateContent xmlns:mc="http://schemas.openxmlformats.org/markup-compatibility/2006">
-        <mc:Choice xmlns:a14="http://schemas.microsoft.com/office/drawing/2010/main" Requires="a14">
+      <mc:AlternateContent xmlns:mc="http://schemas.openxmlformats.org/markup-compatibility/2006" xmlns:a14="http://schemas.microsoft.com/office/drawing/2010/main">
+        <mc:Choice Requires="a14">
           <p:graphicFrame>
             <p:nvGraphicFramePr>
               <p:cNvPr id="4" name="表格 3">
@@ -22557,29 +22516,7 @@
                                                             <a:ea typeface="华文楷体" panose="02010600040101010101" pitchFamily="2" charset="-122"/>
                                                             <a:cs typeface="+mn-cs"/>
                                                           </a:rPr>
-                                                          <m:t>𝑟</m:t>
-                                                        </m:r>
-                                                        <m:r>
-                                                          <a:rPr lang="en-US" altLang="zh-CN" sz="2400" b="0" i="1" kern="1200" smtClean="0">
-                                                            <a:solidFill>
-                                                              <a:schemeClr val="tx1"/>
-                                                            </a:solidFill>
-                                                            <a:latin typeface="Cambria Math" panose="02040503050406030204" pitchFamily="18" charset="0"/>
-                                                            <a:ea typeface="华文楷体" panose="02010600040101010101" pitchFamily="2" charset="-122"/>
-                                                            <a:cs typeface="+mn-cs"/>
-                                                          </a:rPr>
-                                                          <m:t>𝑒𝑐</m:t>
-                                                        </m:r>
-                                                        <m:r>
-                                                          <a:rPr lang="en-US" altLang="zh-CN" sz="2400" b="0" i="1" kern="1200" smtClean="0">
-                                                            <a:solidFill>
-                                                              <a:schemeClr val="tx1"/>
-                                                            </a:solidFill>
-                                                            <a:latin typeface="Cambria Math" panose="02040503050406030204" pitchFamily="18" charset="0"/>
-                                                            <a:ea typeface="华文楷体" panose="02010600040101010101" pitchFamily="2" charset="-122"/>
-                                                            <a:cs typeface="+mn-cs"/>
-                                                          </a:rPr>
-                                                          <m:t>𝑖</m:t>
+                                                          <m:t>𝑟𝑒𝑐𝑖</m:t>
                                                         </m:r>
                                                       </m:sub>
                                                     </m:sSub>
@@ -22793,7 +22730,7 @@
             </a:graphic>
           </p:graphicFrame>
         </mc:Choice>
-        <mc:Fallback>
+        <mc:Fallback xmlns="">
           <p:graphicFrame>
             <p:nvGraphicFramePr>
               <p:cNvPr id="4" name="表格 3">
@@ -22971,8 +22908,8 @@
           </p:graphicFrame>
         </mc:Fallback>
       </mc:AlternateContent>
-      <mc:AlternateContent xmlns:mc="http://schemas.openxmlformats.org/markup-compatibility/2006">
-        <mc:Choice xmlns:a14="http://schemas.microsoft.com/office/drawing/2010/main" Requires="a14">
+      <mc:AlternateContent xmlns:mc="http://schemas.openxmlformats.org/markup-compatibility/2006" xmlns:a14="http://schemas.microsoft.com/office/drawing/2010/main">
+        <mc:Choice Requires="a14">
           <p:sp>
             <p:nvSpPr>
               <p:cNvPr id="9" name="文本框 8">
@@ -23289,7 +23226,7 @@
             </p:txBody>
           </p:sp>
         </mc:Choice>
-        <mc:Fallback>
+        <mc:Fallback xmlns="">
           <p:sp>
             <p:nvSpPr>
               <p:cNvPr id="9" name="文本框 8">
@@ -23394,8 +23331,8 @@
           </a:p>
         </p:txBody>
       </p:sp>
-      <mc:AlternateContent xmlns:mc="http://schemas.openxmlformats.org/markup-compatibility/2006">
-        <mc:Choice xmlns:a14="http://schemas.microsoft.com/office/drawing/2010/main" Requires="a14">
+      <mc:AlternateContent xmlns:mc="http://schemas.openxmlformats.org/markup-compatibility/2006" xmlns:a14="http://schemas.microsoft.com/office/drawing/2010/main">
+        <mc:Choice Requires="a14">
           <p:sp>
             <p:nvSpPr>
               <p:cNvPr id="8" name="文本框 7">
@@ -23485,7 +23422,7 @@
             </p:txBody>
           </p:sp>
         </mc:Choice>
-        <mc:Fallback>
+        <mc:Fallback xmlns="">
           <p:sp>
             <p:nvSpPr>
               <p:cNvPr id="8" name="文本框 7">
@@ -23530,8 +23467,8 @@
           </p:sp>
         </mc:Fallback>
       </mc:AlternateContent>
-      <mc:AlternateContent xmlns:mc="http://schemas.openxmlformats.org/markup-compatibility/2006">
-        <mc:Choice xmlns:a14="http://schemas.microsoft.com/office/drawing/2010/main" Requires="a14">
+      <mc:AlternateContent xmlns:mc="http://schemas.openxmlformats.org/markup-compatibility/2006" xmlns:a14="http://schemas.microsoft.com/office/drawing/2010/main">
+        <mc:Choice Requires="a14">
           <p:graphicFrame>
             <p:nvGraphicFramePr>
               <p:cNvPr id="10" name="表格 9">
@@ -23899,7 +23836,7 @@
             </a:graphic>
           </p:graphicFrame>
         </mc:Choice>
-        <mc:Fallback>
+        <mc:Fallback xmlns="">
           <p:graphicFrame>
             <p:nvGraphicFramePr>
               <p:cNvPr id="10" name="表格 9">
@@ -24090,13 +24027,13 @@
   <p:clrMapOvr>
     <a:masterClrMapping/>
   </p:clrMapOvr>
-  <mc:AlternateContent xmlns:mc="http://schemas.openxmlformats.org/markup-compatibility/2006">
-    <mc:Choice xmlns:p159="http://schemas.microsoft.com/office/powerpoint/2015/09/main" Requires="p159">
+  <mc:AlternateContent xmlns:mc="http://schemas.openxmlformats.org/markup-compatibility/2006" xmlns:p159="http://schemas.microsoft.com/office/powerpoint/2015/09/main">
+    <mc:Choice Requires="p159">
       <p:transition>
         <p159:morph option="byObject"/>
       </p:transition>
     </mc:Choice>
-    <mc:Fallback>
+    <mc:Fallback xmlns="">
       <p:transition>
         <p:fade/>
       </p:transition>

</xml_diff>